<commit_message>
update aspnetcore lab 13 for signalr
</commit_message>
<xml_diff>
--- a/aspnetcore/slides/13_signalr.pptx
+++ b/aspnetcore/slides/13_signalr.pptx
@@ -272,7 +272,7 @@
               <a:pPr>
                 <a:defRPr/>
               </a:pPr>
-              <a:t>11/6/2018</a:t>
+              <a:t>9/6/2019</a:t>
             </a:fld>
             <a:endParaRPr lang="en-US"/>
           </a:p>
@@ -3161,10 +3161,10 @@
       </p:pic>
       <p:pic>
         <p:nvPicPr>
-          <p:cNvPr id="5" name="Picture 4">
+          <p:cNvPr id="6" name="Picture 5">
             <a:extLst>
               <a:ext uri="{FF2B5EF4-FFF2-40B4-BE49-F238E27FC236}">
-                <a16:creationId xmlns:a16="http://schemas.microsoft.com/office/drawing/2014/main" id="{E4630761-25E3-48CA-8CF6-FB84185928EA}"/>
+                <a16:creationId xmlns:a16="http://schemas.microsoft.com/office/drawing/2014/main" id="{42091147-7813-4115-B72F-8EDDC343C17F}"/>
               </a:ext>
             </a:extLst>
           </p:cNvPr>
@@ -3181,8 +3181,8 @@
         </p:blipFill>
         <p:spPr>
           <a:xfrm>
-            <a:off x="2057400" y="3768310"/>
-            <a:ext cx="6396037" cy="1509493"/>
+            <a:off x="1828799" y="3554032"/>
+            <a:ext cx="6644857" cy="1856167"/>
           </a:xfrm>
           <a:prstGeom prst="rect">
             <a:avLst/>

</xml_diff>